<commit_message>
Fixed Date Problem RIA, Docs
</commit_message>
<xml_diff>
--- a/docs/TIW - Documentazione.pptx
+++ b/docs/TIW - Documentazione.pptx
@@ -142,7 +142,7 @@
 <file path=ppt/revisionInfo.xml><?xml version="1.0" encoding="utf-8"?>
 <p1510:revInfo xmlns:a="http://schemas.openxmlformats.org/drawingml/2006/main" xmlns:r="http://schemas.openxmlformats.org/officeDocument/2006/relationships" xmlns:p1510="http://schemas.microsoft.com/office/powerpoint/2015/10/main">
   <p1510:revLst>
-    <p1510:client id="{185900AE-8298-9441-B5C1-94CA14920A4C}" v="252" dt="2022-05-20T14:27:45.824"/>
+    <p1510:client id="{185900AE-8298-9441-B5C1-94CA14920A4C}" v="255" dt="2022-05-21T14:05:08.303"/>
   </p1510:revLst>
 </p1510:revInfo>
 </file>
@@ -152,7 +152,7 @@
   <pc:docChgLst>
     <pc:chgData name="Alessandro Sironi" userId="25d0c03d1cf60993" providerId="LiveId" clId="{185900AE-8298-9441-B5C1-94CA14920A4C}"/>
     <pc:docChg chg="undo redo custSel addSld delSld modSld sldOrd">
-      <pc:chgData name="Alessandro Sironi" userId="25d0c03d1cf60993" providerId="LiveId" clId="{185900AE-8298-9441-B5C1-94CA14920A4C}" dt="2022-05-20T14:40:36.594" v="6652" actId="20577"/>
+      <pc:chgData name="Alessandro Sironi" userId="25d0c03d1cf60993" providerId="LiveId" clId="{185900AE-8298-9441-B5C1-94CA14920A4C}" dt="2022-05-21T14:05:58.859" v="6713" actId="14100"/>
       <pc:docMkLst>
         <pc:docMk/>
       </pc:docMkLst>
@@ -227,7 +227,7 @@
         </pc:picChg>
       </pc:sldChg>
       <pc:sldChg chg="modSp add mod">
-        <pc:chgData name="Alessandro Sironi" userId="25d0c03d1cf60993" providerId="LiveId" clId="{185900AE-8298-9441-B5C1-94CA14920A4C}" dt="2022-05-18T14:26:42.921" v="119" actId="207"/>
+        <pc:chgData name="Alessandro Sironi" userId="25d0c03d1cf60993" providerId="LiveId" clId="{185900AE-8298-9441-B5C1-94CA14920A4C}" dt="2022-05-21T13:50:20.042" v="6658" actId="313"/>
         <pc:sldMkLst>
           <pc:docMk/>
           <pc:sldMk cId="3713047693" sldId="258"/>
@@ -241,7 +241,7 @@
           </ac:spMkLst>
         </pc:spChg>
         <pc:spChg chg="mod">
-          <ac:chgData name="Alessandro Sironi" userId="25d0c03d1cf60993" providerId="LiveId" clId="{185900AE-8298-9441-B5C1-94CA14920A4C}" dt="2022-05-18T14:26:42.921" v="119" actId="207"/>
+          <ac:chgData name="Alessandro Sironi" userId="25d0c03d1cf60993" providerId="LiveId" clId="{185900AE-8298-9441-B5C1-94CA14920A4C}" dt="2022-05-21T13:50:20.042" v="6658" actId="313"/>
           <ac:spMkLst>
             <pc:docMk/>
             <pc:sldMk cId="3713047693" sldId="258"/>
@@ -304,7 +304,7 @@
         </pc:picChg>
       </pc:sldChg>
       <pc:sldChg chg="addSp delSp modSp add mod">
-        <pc:chgData name="Alessandro Sironi" userId="25d0c03d1cf60993" providerId="LiveId" clId="{185900AE-8298-9441-B5C1-94CA14920A4C}" dt="2022-05-18T14:46:34.556" v="866" actId="108"/>
+        <pc:chgData name="Alessandro Sironi" userId="25d0c03d1cf60993" providerId="LiveId" clId="{185900AE-8298-9441-B5C1-94CA14920A4C}" dt="2022-05-21T13:51:50.093" v="6667" actId="1076"/>
         <pc:sldMkLst>
           <pc:docMk/>
           <pc:sldMk cId="2856427955" sldId="260"/>
@@ -390,7 +390,7 @@
           </ac:spMkLst>
         </pc:spChg>
         <pc:spChg chg="add mod">
-          <ac:chgData name="Alessandro Sironi" userId="25d0c03d1cf60993" providerId="LiveId" clId="{185900AE-8298-9441-B5C1-94CA14920A4C}" dt="2022-05-18T14:44:47.127" v="843" actId="1076"/>
+          <ac:chgData name="Alessandro Sironi" userId="25d0c03d1cf60993" providerId="LiveId" clId="{185900AE-8298-9441-B5C1-94CA14920A4C}" dt="2022-05-21T13:51:42.799" v="6665" actId="1076"/>
           <ac:spMkLst>
             <pc:docMk/>
             <pc:sldMk cId="2856427955" sldId="260"/>
@@ -422,7 +422,7 @@
           </ac:spMkLst>
         </pc:spChg>
         <pc:spChg chg="add mod">
-          <ac:chgData name="Alessandro Sironi" userId="25d0c03d1cf60993" providerId="LiveId" clId="{185900AE-8298-9441-B5C1-94CA14920A4C}" dt="2022-05-18T14:44:25.571" v="840" actId="1076"/>
+          <ac:chgData name="Alessandro Sironi" userId="25d0c03d1cf60993" providerId="LiveId" clId="{185900AE-8298-9441-B5C1-94CA14920A4C}" dt="2022-05-21T13:51:24.695" v="6661" actId="1076"/>
           <ac:spMkLst>
             <pc:docMk/>
             <pc:sldMk cId="2856427955" sldId="260"/>
@@ -430,7 +430,7 @@
           </ac:spMkLst>
         </pc:spChg>
         <pc:spChg chg="add mod">
-          <ac:chgData name="Alessandro Sironi" userId="25d0c03d1cf60993" providerId="LiveId" clId="{185900AE-8298-9441-B5C1-94CA14920A4C}" dt="2022-05-18T14:44:47.127" v="843" actId="1076"/>
+          <ac:chgData name="Alessandro Sironi" userId="25d0c03d1cf60993" providerId="LiveId" clId="{185900AE-8298-9441-B5C1-94CA14920A4C}" dt="2022-05-21T13:51:45.399" v="6666" actId="1076"/>
           <ac:spMkLst>
             <pc:docMk/>
             <pc:sldMk cId="2856427955" sldId="260"/>
@@ -446,13 +446,21 @@
           </ac:spMkLst>
         </pc:spChg>
         <pc:spChg chg="add mod">
-          <ac:chgData name="Alessandro Sironi" userId="25d0c03d1cf60993" providerId="LiveId" clId="{185900AE-8298-9441-B5C1-94CA14920A4C}" dt="2022-05-18T14:44:25.571" v="840" actId="1076"/>
+          <ac:chgData name="Alessandro Sironi" userId="25d0c03d1cf60993" providerId="LiveId" clId="{185900AE-8298-9441-B5C1-94CA14920A4C}" dt="2022-05-21T13:51:27.574" v="6662" actId="1076"/>
           <ac:spMkLst>
             <pc:docMk/>
             <pc:sldMk cId="2856427955" sldId="260"/>
             <ac:spMk id="25" creationId="{B69038A3-F081-19D0-5937-3D5B404B6859}"/>
           </ac:spMkLst>
         </pc:spChg>
+        <pc:spChg chg="add mod">
+          <ac:chgData name="Alessandro Sironi" userId="25d0c03d1cf60993" providerId="LiveId" clId="{185900AE-8298-9441-B5C1-94CA14920A4C}" dt="2022-05-21T13:51:14.870" v="6660" actId="1076"/>
+          <ac:spMkLst>
+            <pc:docMk/>
+            <pc:sldMk cId="2856427955" sldId="260"/>
+            <ac:spMk id="27" creationId="{06473F3D-7A24-A505-217C-A8374FA5CA19}"/>
+          </ac:spMkLst>
+        </pc:spChg>
         <pc:spChg chg="add del mod">
           <ac:chgData name="Alessandro Sironi" userId="25d0c03d1cf60993" providerId="LiveId" clId="{185900AE-8298-9441-B5C1-94CA14920A4C}" dt="2022-05-18T14:37:56.246" v="672" actId="478"/>
           <ac:spMkLst>
@@ -494,7 +502,7 @@
           </ac:spMkLst>
         </pc:spChg>
         <pc:spChg chg="add mod">
-          <ac:chgData name="Alessandro Sironi" userId="25d0c03d1cf60993" providerId="LiveId" clId="{185900AE-8298-9441-B5C1-94CA14920A4C}" dt="2022-05-18T14:45:58.159" v="862" actId="1076"/>
+          <ac:chgData name="Alessandro Sironi" userId="25d0c03d1cf60993" providerId="LiveId" clId="{185900AE-8298-9441-B5C1-94CA14920A4C}" dt="2022-05-21T13:51:50.093" v="6667" actId="1076"/>
           <ac:spMkLst>
             <pc:docMk/>
             <pc:sldMk cId="2856427955" sldId="260"/>
@@ -669,7 +677,7 @@
         </pc:picChg>
       </pc:sldChg>
       <pc:sldChg chg="modSp add mod ord">
-        <pc:chgData name="Alessandro Sironi" userId="25d0c03d1cf60993" providerId="LiveId" clId="{185900AE-8298-9441-B5C1-94CA14920A4C}" dt="2022-05-18T15:02:23.226" v="1041" actId="20578"/>
+        <pc:chgData name="Alessandro Sironi" userId="25d0c03d1cf60993" providerId="LiveId" clId="{185900AE-8298-9441-B5C1-94CA14920A4C}" dt="2022-05-21T13:54:53.135" v="6669" actId="207"/>
         <pc:sldMkLst>
           <pc:docMk/>
           <pc:sldMk cId="3399096203" sldId="263"/>
@@ -683,7 +691,7 @@
           </ac:spMkLst>
         </pc:spChg>
         <pc:spChg chg="mod">
-          <ac:chgData name="Alessandro Sironi" userId="25d0c03d1cf60993" providerId="LiveId" clId="{185900AE-8298-9441-B5C1-94CA14920A4C}" dt="2022-05-18T15:02:23.226" v="1041" actId="20578"/>
+          <ac:chgData name="Alessandro Sironi" userId="25d0c03d1cf60993" providerId="LiveId" clId="{185900AE-8298-9441-B5C1-94CA14920A4C}" dt="2022-05-21T13:54:53.135" v="6669" actId="207"/>
           <ac:spMkLst>
             <pc:docMk/>
             <pc:sldMk cId="3399096203" sldId="263"/>
@@ -3179,7 +3187,7 @@
         </pc:picChg>
       </pc:sldChg>
       <pc:sldChg chg="addSp delSp modSp add mod">
-        <pc:chgData name="Alessandro Sironi" userId="25d0c03d1cf60993" providerId="LiveId" clId="{185900AE-8298-9441-B5C1-94CA14920A4C}" dt="2022-05-19T13:30:11.562" v="3937" actId="1076"/>
+        <pc:chgData name="Alessandro Sironi" userId="25d0c03d1cf60993" providerId="LiveId" clId="{185900AE-8298-9441-B5C1-94CA14920A4C}" dt="2022-05-21T13:59:05.349" v="6682" actId="1076"/>
         <pc:sldMkLst>
           <pc:docMk/>
           <pc:sldMk cId="1176060411" sldId="270"/>
@@ -3190,6 +3198,22 @@
             <pc:docMk/>
             <pc:sldMk cId="1176060411" sldId="270"/>
             <ac:spMk id="2" creationId="{968573FC-2D4C-78D1-C9BC-E6A5DEF6891C}"/>
+          </ac:spMkLst>
+        </pc:spChg>
+        <pc:spChg chg="add mod">
+          <ac:chgData name="Alessandro Sironi" userId="25d0c03d1cf60993" providerId="LiveId" clId="{185900AE-8298-9441-B5C1-94CA14920A4C}" dt="2022-05-21T13:58:30.795" v="6672" actId="2085"/>
+          <ac:spMkLst>
+            <pc:docMk/>
+            <pc:sldMk cId="1176060411" sldId="270"/>
+            <ac:spMk id="3" creationId="{FE8EDC5D-CE28-2819-5C04-9FBB83B05095}"/>
+          </ac:spMkLst>
+        </pc:spChg>
+        <pc:spChg chg="add mod">
+          <ac:chgData name="Alessandro Sironi" userId="25d0c03d1cf60993" providerId="LiveId" clId="{185900AE-8298-9441-B5C1-94CA14920A4C}" dt="2022-05-21T13:59:05.349" v="6682" actId="1076"/>
+          <ac:spMkLst>
+            <pc:docMk/>
+            <pc:sldMk cId="1176060411" sldId="270"/>
+            <ac:spMk id="6" creationId="{15BC4EA5-2020-CE6C-C5F0-06558FC32AB3}"/>
           </ac:spMkLst>
         </pc:spChg>
         <pc:spChg chg="add mod">
@@ -3452,7 +3476,7 @@
         </pc:spChg>
       </pc:sldChg>
       <pc:sldChg chg="addSp modSp new mod">
-        <pc:chgData name="Alessandro Sironi" userId="25d0c03d1cf60993" providerId="LiveId" clId="{185900AE-8298-9441-B5C1-94CA14920A4C}" dt="2022-05-20T14:23:58.503" v="6605"/>
+        <pc:chgData name="Alessandro Sironi" userId="25d0c03d1cf60993" providerId="LiveId" clId="{185900AE-8298-9441-B5C1-94CA14920A4C}" dt="2022-05-21T14:02:40.239" v="6689" actId="207"/>
         <pc:sldMkLst>
           <pc:docMk/>
           <pc:sldMk cId="3004049332" sldId="275"/>
@@ -3466,7 +3490,7 @@
           </ac:spMkLst>
         </pc:spChg>
         <pc:spChg chg="mod">
-          <ac:chgData name="Alessandro Sironi" userId="25d0c03d1cf60993" providerId="LiveId" clId="{185900AE-8298-9441-B5C1-94CA14920A4C}" dt="2022-05-19T13:51:36.640" v="4310" actId="207"/>
+          <ac:chgData name="Alessandro Sironi" userId="25d0c03d1cf60993" providerId="LiveId" clId="{185900AE-8298-9441-B5C1-94CA14920A4C}" dt="2022-05-21T14:02:40.239" v="6689" actId="207"/>
           <ac:spMkLst>
             <pc:docMk/>
             <pc:sldMk cId="3004049332" sldId="275"/>
@@ -3483,7 +3507,7 @@
         </pc:picChg>
       </pc:sldChg>
       <pc:sldChg chg="modSp add mod ord">
-        <pc:chgData name="Alessandro Sironi" userId="25d0c03d1cf60993" providerId="LiveId" clId="{185900AE-8298-9441-B5C1-94CA14920A4C}" dt="2022-05-19T14:28:05.582" v="4755" actId="20577"/>
+        <pc:chgData name="Alessandro Sironi" userId="25d0c03d1cf60993" providerId="LiveId" clId="{185900AE-8298-9441-B5C1-94CA14920A4C}" dt="2022-05-21T14:03:12.018" v="6692" actId="400"/>
         <pc:sldMkLst>
           <pc:docMk/>
           <pc:sldMk cId="2719356015" sldId="276"/>
@@ -3497,7 +3521,7 @@
           </ac:spMkLst>
         </pc:spChg>
         <pc:spChg chg="mod">
-          <ac:chgData name="Alessandro Sironi" userId="25d0c03d1cf60993" providerId="LiveId" clId="{185900AE-8298-9441-B5C1-94CA14920A4C}" dt="2022-05-19T14:28:05.582" v="4755" actId="20577"/>
+          <ac:chgData name="Alessandro Sironi" userId="25d0c03d1cf60993" providerId="LiveId" clId="{185900AE-8298-9441-B5C1-94CA14920A4C}" dt="2022-05-21T14:03:12.018" v="6692" actId="400"/>
           <ac:spMkLst>
             <pc:docMk/>
             <pc:sldMk cId="2719356015" sldId="276"/>
@@ -3624,12 +3648,20 @@
         </pc:cxnChg>
       </pc:sldChg>
       <pc:sldChg chg="addSp delSp modSp add mod">
-        <pc:chgData name="Alessandro Sironi" userId="25d0c03d1cf60993" providerId="LiveId" clId="{185900AE-8298-9441-B5C1-94CA14920A4C}" dt="2022-05-20T14:28:21.459" v="6649" actId="14100"/>
+        <pc:chgData name="Alessandro Sironi" userId="25d0c03d1cf60993" providerId="LiveId" clId="{185900AE-8298-9441-B5C1-94CA14920A4C}" dt="2022-05-21T14:05:58.859" v="6713" actId="14100"/>
         <pc:sldMkLst>
           <pc:docMk/>
           <pc:sldMk cId="1892993377" sldId="279"/>
         </pc:sldMkLst>
         <pc:spChg chg="del">
+          <ac:chgData name="Alessandro Sironi" userId="25d0c03d1cf60993" providerId="LiveId" clId="{185900AE-8298-9441-B5C1-94CA14920A4C}" dt="2022-05-21T14:04:21.544" v="6698" actId="478"/>
+          <ac:spMkLst>
+            <pc:docMk/>
+            <pc:sldMk cId="1892993377" sldId="279"/>
+            <ac:spMk id="2" creationId="{BC2F05A7-6590-308D-B177-A3FBC99EE482}"/>
+          </ac:spMkLst>
+        </pc:spChg>
+        <pc:spChg chg="del">
           <ac:chgData name="Alessandro Sironi" userId="25d0c03d1cf60993" providerId="LiveId" clId="{185900AE-8298-9441-B5C1-94CA14920A4C}" dt="2022-05-19T14:19:19.572" v="4535" actId="478"/>
           <ac:spMkLst>
             <pc:docMk/>
@@ -3653,6 +3685,14 @@
             <ac:spMk id="8" creationId="{26D880D1-F36F-1BE9-6AF2-2057BD98DF9C}"/>
           </ac:spMkLst>
         </pc:spChg>
+        <pc:spChg chg="add del mod">
+          <ac:chgData name="Alessandro Sironi" userId="25d0c03d1cf60993" providerId="LiveId" clId="{185900AE-8298-9441-B5C1-94CA14920A4C}" dt="2022-05-21T14:04:23.342" v="6699" actId="478"/>
+          <ac:spMkLst>
+            <pc:docMk/>
+            <pc:sldMk cId="1892993377" sldId="279"/>
+            <ac:spMk id="10" creationId="{46927011-081D-21DC-20A9-B9E888AC1AFC}"/>
+          </ac:spMkLst>
+        </pc:spChg>
         <pc:spChg chg="del">
           <ac:chgData name="Alessandro Sironi" userId="25d0c03d1cf60993" providerId="LiveId" clId="{185900AE-8298-9441-B5C1-94CA14920A4C}" dt="2022-05-19T14:19:19.572" v="4535" actId="478"/>
           <ac:spMkLst>
@@ -3862,7 +3902,7 @@
           </ac:spMkLst>
         </pc:spChg>
         <pc:spChg chg="add mod">
-          <ac:chgData name="Alessandro Sironi" userId="25d0c03d1cf60993" providerId="LiveId" clId="{185900AE-8298-9441-B5C1-94CA14920A4C}" dt="2022-05-20T14:27:51.410" v="6626" actId="1076"/>
+          <ac:chgData name="Alessandro Sironi" userId="25d0c03d1cf60993" providerId="LiveId" clId="{185900AE-8298-9441-B5C1-94CA14920A4C}" dt="2022-05-21T14:03:55.218" v="6694" actId="1076"/>
           <ac:spMkLst>
             <pc:docMk/>
             <pc:sldMk cId="1892993377" sldId="279"/>
@@ -3870,7 +3910,7 @@
           </ac:spMkLst>
         </pc:spChg>
         <pc:spChg chg="add mod">
-          <ac:chgData name="Alessandro Sironi" userId="25d0c03d1cf60993" providerId="LiveId" clId="{185900AE-8298-9441-B5C1-94CA14920A4C}" dt="2022-05-20T14:27:55.446" v="6643" actId="20577"/>
+          <ac:chgData name="Alessandro Sironi" userId="25d0c03d1cf60993" providerId="LiveId" clId="{185900AE-8298-9441-B5C1-94CA14920A4C}" dt="2022-05-21T14:04:10.194" v="6696" actId="1076"/>
           <ac:spMkLst>
             <pc:docMk/>
             <pc:sldMk cId="1892993377" sldId="279"/>
@@ -3893,6 +3933,14 @@
             <ac:spMk id="61" creationId="{8995E6FD-2F64-6C57-9980-EDD440F30EDA}"/>
           </ac:spMkLst>
         </pc:spChg>
+        <pc:spChg chg="add del mod">
+          <ac:chgData name="Alessandro Sironi" userId="25d0c03d1cf60993" providerId="LiveId" clId="{185900AE-8298-9441-B5C1-94CA14920A4C}" dt="2022-05-21T14:05:10.852" v="6705" actId="478"/>
+          <ac:spMkLst>
+            <pc:docMk/>
+            <pc:sldMk cId="1892993377" sldId="279"/>
+            <ac:spMk id="61" creationId="{FF44566D-2653-49B7-456B-B1E790DCC970}"/>
+          </ac:spMkLst>
+        </pc:spChg>
         <pc:spChg chg="add mod">
           <ac:chgData name="Alessandro Sironi" userId="25d0c03d1cf60993" providerId="LiveId" clId="{185900AE-8298-9441-B5C1-94CA14920A4C}" dt="2022-05-19T14:35:09.242" v="4869" actId="1076"/>
           <ac:spMkLst>
@@ -3902,7 +3950,7 @@
           </ac:spMkLst>
         </pc:spChg>
         <pc:spChg chg="add mod">
-          <ac:chgData name="Alessandro Sironi" userId="25d0c03d1cf60993" providerId="LiveId" clId="{185900AE-8298-9441-B5C1-94CA14920A4C}" dt="2022-05-19T14:21:45.956" v="4579" actId="1076"/>
+          <ac:chgData name="Alessandro Sironi" userId="25d0c03d1cf60993" providerId="LiveId" clId="{185900AE-8298-9441-B5C1-94CA14920A4C}" dt="2022-05-21T14:04:16.670" v="6697" actId="1076"/>
           <ac:spMkLst>
             <pc:docMk/>
             <pc:sldMk cId="1892993377" sldId="279"/>
@@ -3974,7 +4022,7 @@
           </ac:spMkLst>
         </pc:spChg>
         <pc:spChg chg="add mod">
-          <ac:chgData name="Alessandro Sironi" userId="25d0c03d1cf60993" providerId="LiveId" clId="{185900AE-8298-9441-B5C1-94CA14920A4C}" dt="2022-05-20T14:27:27.035" v="6624" actId="1076"/>
+          <ac:chgData name="Alessandro Sironi" userId="25d0c03d1cf60993" providerId="LiveId" clId="{185900AE-8298-9441-B5C1-94CA14920A4C}" dt="2022-05-21T14:05:14.273" v="6706" actId="1076"/>
           <ac:spMkLst>
             <pc:docMk/>
             <pc:sldMk cId="1892993377" sldId="279"/>
@@ -4102,7 +4150,7 @@
           </ac:spMkLst>
         </pc:spChg>
         <pc:spChg chg="add mod">
-          <ac:chgData name="Alessandro Sironi" userId="25d0c03d1cf60993" providerId="LiveId" clId="{185900AE-8298-9441-B5C1-94CA14920A4C}" dt="2022-05-19T14:38:03.995" v="4964"/>
+          <ac:chgData name="Alessandro Sironi" userId="25d0c03d1cf60993" providerId="LiveId" clId="{185900AE-8298-9441-B5C1-94CA14920A4C}" dt="2022-05-21T14:05:44.494" v="6711" actId="1076"/>
           <ac:spMkLst>
             <pc:docMk/>
             <pc:sldMk cId="1892993377" sldId="279"/>
@@ -4110,7 +4158,7 @@
           </ac:spMkLst>
         </pc:spChg>
         <pc:spChg chg="add mod">
-          <ac:chgData name="Alessandro Sironi" userId="25d0c03d1cf60993" providerId="LiveId" clId="{185900AE-8298-9441-B5C1-94CA14920A4C}" dt="2022-05-19T14:38:13.412" v="4970" actId="20577"/>
+          <ac:chgData name="Alessandro Sironi" userId="25d0c03d1cf60993" providerId="LiveId" clId="{185900AE-8298-9441-B5C1-94CA14920A4C}" dt="2022-05-21T14:05:52.394" v="6712" actId="1076"/>
           <ac:spMkLst>
             <pc:docMk/>
             <pc:sldMk cId="1892993377" sldId="279"/>
@@ -4142,7 +4190,7 @@
           </ac:cxnSpMkLst>
         </pc:cxnChg>
         <pc:cxnChg chg="add mod">
-          <ac:chgData name="Alessandro Sironi" userId="25d0c03d1cf60993" providerId="LiveId" clId="{185900AE-8298-9441-B5C1-94CA14920A4C}" dt="2022-05-20T14:26:32.617" v="6618" actId="14100"/>
+          <ac:chgData name="Alessandro Sironi" userId="25d0c03d1cf60993" providerId="LiveId" clId="{185900AE-8298-9441-B5C1-94CA14920A4C}" dt="2022-05-21T14:03:49.744" v="6693" actId="14100"/>
           <ac:cxnSpMkLst>
             <pc:docMk/>
             <pc:sldMk cId="1892993377" sldId="279"/>
@@ -4150,7 +4198,7 @@
           </ac:cxnSpMkLst>
         </pc:cxnChg>
         <pc:cxnChg chg="add mod">
-          <ac:chgData name="Alessandro Sironi" userId="25d0c03d1cf60993" providerId="LiveId" clId="{185900AE-8298-9441-B5C1-94CA14920A4C}" dt="2022-05-20T14:28:21.459" v="6649" actId="14100"/>
+          <ac:chgData name="Alessandro Sironi" userId="25d0c03d1cf60993" providerId="LiveId" clId="{185900AE-8298-9441-B5C1-94CA14920A4C}" dt="2022-05-21T14:04:38.703" v="6700" actId="14100"/>
           <ac:cxnSpMkLst>
             <pc:docMk/>
             <pc:sldMk cId="1892993377" sldId="279"/>
@@ -4254,7 +4302,7 @@
           </ac:cxnSpMkLst>
         </pc:cxnChg>
         <pc:cxnChg chg="add mod">
-          <ac:chgData name="Alessandro Sironi" userId="25d0c03d1cf60993" providerId="LiveId" clId="{185900AE-8298-9441-B5C1-94CA14920A4C}" dt="2022-05-20T14:28:02.594" v="6645" actId="1076"/>
+          <ac:chgData name="Alessandro Sironi" userId="25d0c03d1cf60993" providerId="LiveId" clId="{185900AE-8298-9441-B5C1-94CA14920A4C}" dt="2022-05-21T14:04:01.751" v="6695" actId="14100"/>
           <ac:cxnSpMkLst>
             <pc:docMk/>
             <pc:sldMk cId="1892993377" sldId="279"/>
@@ -4278,7 +4326,7 @@
           </ac:cxnSpMkLst>
         </pc:cxnChg>
         <pc:cxnChg chg="add mod">
-          <ac:chgData name="Alessandro Sironi" userId="25d0c03d1cf60993" providerId="LiveId" clId="{185900AE-8298-9441-B5C1-94CA14920A4C}" dt="2022-05-19T14:37:23.206" v="4923" actId="14100"/>
+          <ac:chgData name="Alessandro Sironi" userId="25d0c03d1cf60993" providerId="LiveId" clId="{185900AE-8298-9441-B5C1-94CA14920A4C}" dt="2022-05-21T14:05:58.859" v="6713" actId="14100"/>
           <ac:cxnSpMkLst>
             <pc:docMk/>
             <pc:sldMk cId="1892993377" sldId="279"/>
@@ -4670,7 +4718,7 @@
           <a:p>
             <a:fld id="{374348BB-10C7-024C-B781-712AB48971D0}" type="datetimeFigureOut">
               <a:rPr lang="it-IT" smtClean="0"/>
-              <a:t>20/05/22</a:t>
+              <a:t>21/05/22</a:t>
             </a:fld>
             <a:endParaRPr lang="it-IT"/>
           </a:p>
@@ -4868,7 +4916,7 @@
           <a:p>
             <a:fld id="{374348BB-10C7-024C-B781-712AB48971D0}" type="datetimeFigureOut">
               <a:rPr lang="it-IT" smtClean="0"/>
-              <a:t>20/05/22</a:t>
+              <a:t>21/05/22</a:t>
             </a:fld>
             <a:endParaRPr lang="it-IT"/>
           </a:p>
@@ -5076,7 +5124,7 @@
           <a:p>
             <a:fld id="{374348BB-10C7-024C-B781-712AB48971D0}" type="datetimeFigureOut">
               <a:rPr lang="it-IT" smtClean="0"/>
-              <a:t>20/05/22</a:t>
+              <a:t>21/05/22</a:t>
             </a:fld>
             <a:endParaRPr lang="it-IT"/>
           </a:p>
@@ -5274,7 +5322,7 @@
           <a:p>
             <a:fld id="{374348BB-10C7-024C-B781-712AB48971D0}" type="datetimeFigureOut">
               <a:rPr lang="it-IT" smtClean="0"/>
-              <a:t>20/05/22</a:t>
+              <a:t>21/05/22</a:t>
             </a:fld>
             <a:endParaRPr lang="it-IT"/>
           </a:p>
@@ -5549,7 +5597,7 @@
           <a:p>
             <a:fld id="{374348BB-10C7-024C-B781-712AB48971D0}" type="datetimeFigureOut">
               <a:rPr lang="it-IT" smtClean="0"/>
-              <a:t>20/05/22</a:t>
+              <a:t>21/05/22</a:t>
             </a:fld>
             <a:endParaRPr lang="it-IT"/>
           </a:p>
@@ -5814,7 +5862,7 @@
           <a:p>
             <a:fld id="{374348BB-10C7-024C-B781-712AB48971D0}" type="datetimeFigureOut">
               <a:rPr lang="it-IT" smtClean="0"/>
-              <a:t>20/05/22</a:t>
+              <a:t>21/05/22</a:t>
             </a:fld>
             <a:endParaRPr lang="it-IT"/>
           </a:p>
@@ -6226,7 +6274,7 @@
           <a:p>
             <a:fld id="{374348BB-10C7-024C-B781-712AB48971D0}" type="datetimeFigureOut">
               <a:rPr lang="it-IT" smtClean="0"/>
-              <a:t>20/05/22</a:t>
+              <a:t>21/05/22</a:t>
             </a:fld>
             <a:endParaRPr lang="it-IT"/>
           </a:p>
@@ -6367,7 +6415,7 @@
           <a:p>
             <a:fld id="{374348BB-10C7-024C-B781-712AB48971D0}" type="datetimeFigureOut">
               <a:rPr lang="it-IT" smtClean="0"/>
-              <a:t>20/05/22</a:t>
+              <a:t>21/05/22</a:t>
             </a:fld>
             <a:endParaRPr lang="it-IT"/>
           </a:p>
@@ -6480,7 +6528,7 @@
           <a:p>
             <a:fld id="{374348BB-10C7-024C-B781-712AB48971D0}" type="datetimeFigureOut">
               <a:rPr lang="it-IT" smtClean="0"/>
-              <a:t>20/05/22</a:t>
+              <a:t>21/05/22</a:t>
             </a:fld>
             <a:endParaRPr lang="it-IT"/>
           </a:p>
@@ -6791,7 +6839,7 @@
           <a:p>
             <a:fld id="{374348BB-10C7-024C-B781-712AB48971D0}" type="datetimeFigureOut">
               <a:rPr lang="it-IT" smtClean="0"/>
-              <a:t>20/05/22</a:t>
+              <a:t>21/05/22</a:t>
             </a:fld>
             <a:endParaRPr lang="it-IT"/>
           </a:p>
@@ -7079,7 +7127,7 @@
           <a:p>
             <a:fld id="{374348BB-10C7-024C-B781-712AB48971D0}" type="datetimeFigureOut">
               <a:rPr lang="it-IT" smtClean="0"/>
-              <a:t>20/05/22</a:t>
+              <a:t>21/05/22</a:t>
             </a:fld>
             <a:endParaRPr lang="it-IT"/>
           </a:p>
@@ -7320,7 +7368,7 @@
           <a:p>
             <a:fld id="{374348BB-10C7-024C-B781-712AB48971D0}" type="datetimeFigureOut">
               <a:rPr lang="it-IT" smtClean="0"/>
-              <a:t>20/05/22</a:t>
+              <a:t>21/05/22</a:t>
             </a:fld>
             <a:endParaRPr lang="it-IT"/>
           </a:p>
@@ -11831,6 +11879,93 @@
           </a:p>
         </p:txBody>
       </p:sp>
+      <p:sp>
+        <p:nvSpPr>
+          <p:cNvPr id="3" name="Rettangolo 2">
+            <a:extLst>
+              <a:ext uri="{FF2B5EF4-FFF2-40B4-BE49-F238E27FC236}">
+                <a16:creationId xmlns:a16="http://schemas.microsoft.com/office/drawing/2014/main" id="{FE8EDC5D-CE28-2819-5C04-9FBB83B05095}"/>
+              </a:ext>
+            </a:extLst>
+          </p:cNvPr>
+          <p:cNvSpPr/>
+          <p:nvPr/>
+        </p:nvSpPr>
+        <p:spPr>
+          <a:xfrm>
+            <a:off x="6677025" y="4681538"/>
+            <a:ext cx="1390650" cy="138112"/>
+          </a:xfrm>
+          <a:prstGeom prst="rect">
+            <a:avLst/>
+          </a:prstGeom>
+          <a:solidFill>
+            <a:schemeClr val="bg1"/>
+          </a:solidFill>
+          <a:ln>
+            <a:noFill/>
+          </a:ln>
+        </p:spPr>
+        <p:style>
+          <a:lnRef idx="2">
+            <a:schemeClr val="accent1">
+              <a:shade val="50000"/>
+            </a:schemeClr>
+          </a:lnRef>
+          <a:fillRef idx="1">
+            <a:schemeClr val="accent1"/>
+          </a:fillRef>
+          <a:effectRef idx="0">
+            <a:schemeClr val="accent1"/>
+          </a:effectRef>
+          <a:fontRef idx="minor">
+            <a:schemeClr val="lt1"/>
+          </a:fontRef>
+        </p:style>
+        <p:txBody>
+          <a:bodyPr rtlCol="0" anchor="ctr"/>
+          <a:lstStyle/>
+          <a:p>
+            <a:pPr algn="ctr"/>
+            <a:endParaRPr lang="it-IT"/>
+          </a:p>
+        </p:txBody>
+      </p:sp>
+      <p:sp>
+        <p:nvSpPr>
+          <p:cNvPr id="6" name="CasellaDiTesto 5">
+            <a:extLst>
+              <a:ext uri="{FF2B5EF4-FFF2-40B4-BE49-F238E27FC236}">
+                <a16:creationId xmlns:a16="http://schemas.microsoft.com/office/drawing/2014/main" id="{15BC4EA5-2020-CE6C-C5F0-06558FC32AB3}"/>
+              </a:ext>
+            </a:extLst>
+          </p:cNvPr>
+          <p:cNvSpPr txBox="1"/>
+          <p:nvPr/>
+        </p:nvSpPr>
+        <p:spPr>
+          <a:xfrm>
+            <a:off x="6586537" y="4612094"/>
+            <a:ext cx="785813" cy="276999"/>
+          </a:xfrm>
+          <a:prstGeom prst="rect">
+            <a:avLst/>
+          </a:prstGeom>
+          <a:noFill/>
+        </p:spPr>
+        <p:txBody>
+          <a:bodyPr wrap="square" rtlCol="0">
+            <a:spAutoFit/>
+          </a:bodyPr>
+          <a:lstStyle/>
+          <a:p>
+            <a:r>
+              <a:rPr lang="it-IT" sz="1200" dirty="0"/>
+              <a:t>…</a:t>
+            </a:r>
+          </a:p>
+        </p:txBody>
+      </p:sp>
     </p:spTree>
     <p:extLst>
       <p:ext uri="{BB962C8B-B14F-4D97-AF65-F5344CB8AC3E}">
@@ -13064,15 +13199,7 @@
             </a:r>
             <a:r>
               <a:rPr lang="it-IT" dirty="0"/>
-              <a:t>. La registrazione controlla la </a:t>
-            </a:r>
-            <a:r>
-              <a:rPr lang="it-IT" dirty="0" err="1"/>
-              <a:t>validita</a:t>
-            </a:r>
-            <a:r>
-              <a:rPr lang="it-IT" dirty="0"/>
-              <a:t>̀ sintattica dell’indirizzo di email e l’uguaglianza tra i campi “password” e “ripeti password”, anche a lato client. La registrazione controlla l’</a:t>
+              <a:t>. La registrazione controlla la validità sintattica dell’indirizzo di email e l’uguaglianza tra i campi “password” e “ripeti password”, anche a lato client. La registrazione controlla l’</a:t>
             </a:r>
             <a:r>
               <a:rPr lang="it-IT" dirty="0" err="1"/>
@@ -13109,7 +13236,7 @@
             <a:r>
               <a:rPr lang="it-IT" dirty="0">
                 <a:solidFill>
-                  <a:srgbClr val="92D050"/>
+                  <a:srgbClr val="00B050"/>
                 </a:solidFill>
               </a:rPr>
               <a:t>pagina modale </a:t>
@@ -13121,7 +13248,7 @@
             <a:r>
               <a:rPr lang="it-IT" dirty="0">
                 <a:solidFill>
-                  <a:srgbClr val="92D050"/>
+                  <a:srgbClr val="00B050"/>
                 </a:solidFill>
               </a:rPr>
               <a:t>bottoni</a:t>
@@ -13174,7 +13301,19 @@
           <a:p>
             <a:r>
               <a:rPr lang="it-IT" dirty="0"/>
-              <a:t>I controlli di correttezza del numero di invitati e del massimo numero di tentativi, con i relativi messaggi di avvertimento, devono essere realizzati anche a lato client. </a:t>
+              <a:t>I controlli di correttezza del numero di invitati e del massimo numero di tentativi, con i relativi </a:t>
+            </a:r>
+            <a:r>
+              <a:rPr lang="it-IT" dirty="0">
+                <a:solidFill>
+                  <a:srgbClr val="00B050"/>
+                </a:solidFill>
+              </a:rPr>
+              <a:t>messaggi di avvertimento</a:t>
+            </a:r>
+            <a:r>
+              <a:rPr lang="it-IT" dirty="0"/>
+              <a:t>, devono essere realizzati anche a lato client. </a:t>
             </a:r>
           </a:p>
           <a:p>
@@ -14007,13 +14146,16 @@
               </a:rPr>
               <a:t>GoToErrorCreationMeeting</a:t>
             </a:r>
-            <a:endParaRPr lang="it-IT" sz="1600" strike="sngStrike" dirty="0">
-              <a:solidFill>
-                <a:schemeClr val="bg1">
-                  <a:lumMod val="50000"/>
-                </a:schemeClr>
-              </a:solidFill>
-            </a:endParaRPr>
+            <a:r>
+              <a:rPr lang="it-IT" sz="1600" dirty="0">
+                <a:solidFill>
+                  <a:schemeClr val="bg1">
+                    <a:lumMod val="50000"/>
+                  </a:schemeClr>
+                </a:solidFill>
+              </a:rPr>
+              <a:t> </a:t>
+            </a:r>
           </a:p>
           <a:p>
             <a:pPr lvl="1"/>
@@ -16239,34 +16381,6 @@
       </p:pic>
       <p:sp>
         <p:nvSpPr>
-          <p:cNvPr id="2" name="Titolo 1">
-            <a:extLst>
-              <a:ext uri="{FF2B5EF4-FFF2-40B4-BE49-F238E27FC236}">
-                <a16:creationId xmlns:a16="http://schemas.microsoft.com/office/drawing/2014/main" id="{BC2F05A7-6590-308D-B177-A3FBC99EE482}"/>
-              </a:ext>
-            </a:extLst>
-          </p:cNvPr>
-          <p:cNvSpPr>
-            <a:spLocks noGrp="1"/>
-          </p:cNvSpPr>
-          <p:nvPr>
-            <p:ph type="title"/>
-          </p:nvPr>
-        </p:nvSpPr>
-        <p:spPr/>
-        <p:txBody>
-          <a:bodyPr/>
-          <a:lstStyle/>
-          <a:p>
-            <a:r>
-              <a:rPr lang="it-IT" dirty="0"/>
-              <a:t>Application Design</a:t>
-            </a:r>
-          </a:p>
-        </p:txBody>
-      </p:sp>
-      <p:sp>
-        <p:nvSpPr>
           <p:cNvPr id="44" name="Rettangolo 43">
             <a:extLst>
               <a:ext uri="{FF2B5EF4-FFF2-40B4-BE49-F238E27FC236}">
@@ -16914,7 +17028,7 @@
         </p:nvSpPr>
         <p:spPr>
           <a:xfrm>
-            <a:off x="5397732" y="910854"/>
+            <a:off x="5318772" y="910086"/>
             <a:ext cx="1396536" cy="369332"/>
           </a:xfrm>
           <a:prstGeom prst="rect">
@@ -17347,8 +17461,8 @@
         </p:nvSpPr>
         <p:spPr>
           <a:xfrm>
-            <a:off x="7439687" y="1862103"/>
-            <a:ext cx="951312" cy="369332"/>
+            <a:off x="7634739" y="1978099"/>
+            <a:ext cx="951312" cy="307777"/>
           </a:xfrm>
           <a:prstGeom prst="rect">
             <a:avLst/>
@@ -17362,7 +17476,7 @@
           <a:lstStyle/>
           <a:p>
             <a:r>
-              <a:rPr lang="it-IT" dirty="0" err="1"/>
+              <a:rPr lang="it-IT" sz="1400" dirty="0" err="1"/>
               <a:t>Cancel</a:t>
             </a:r>
             <a:endParaRPr lang="it-IT" dirty="0"/>
@@ -17825,12 +17939,12 @@
         </p:nvCxnSpPr>
         <p:spPr>
           <a:xfrm rot="5400000" flipH="1" flipV="1">
-            <a:off x="4943805" y="4890378"/>
-            <a:ext cx="217028" cy="191755"/>
+            <a:off x="5000696" y="4906793"/>
+            <a:ext cx="143722" cy="232230"/>
           </a:xfrm>
           <a:prstGeom prst="bentConnector3">
             <a:avLst>
-              <a:gd name="adj1" fmla="val 50000"/>
+              <a:gd name="adj1" fmla="val 27278"/>
             </a:avLst>
           </a:prstGeom>
           <a:ln>
@@ -18183,19 +18297,20 @@
           </p:cNvPr>
           <p:cNvCxnSpPr>
             <a:cxnSpLocks/>
-            <a:stCxn id="111" idx="6"/>
+            <a:stCxn id="111" idx="4"/>
             <a:endCxn id="62" idx="2"/>
           </p:cNvCxnSpPr>
           <p:nvPr/>
         </p:nvCxnSpPr>
         <p:spPr>
-          <a:xfrm flipH="1" flipV="1">
-            <a:off x="6842849" y="1090529"/>
-            <a:ext cx="3359918" cy="3440430"/>
-          </a:xfrm>
-          <a:prstGeom prst="bentConnector3">
+          <a:xfrm rot="5400000" flipH="1">
+            <a:off x="6677465" y="1255913"/>
+            <a:ext cx="3565558" cy="3234790"/>
+          </a:xfrm>
+          <a:prstGeom prst="bentConnector4">
             <a:avLst>
-              <a:gd name="adj1" fmla="val -30581"/>
+              <a:gd name="adj1" fmla="val -6411"/>
+              <a:gd name="adj2" fmla="val -28908"/>
             </a:avLst>
           </a:prstGeom>
           <a:ln>
@@ -18231,7 +18346,7 @@
         </p:nvSpPr>
         <p:spPr>
           <a:xfrm>
-            <a:off x="11037529" y="4149931"/>
+            <a:off x="10228298" y="4436076"/>
             <a:ext cx="922569" cy="523220"/>
           </a:xfrm>
           <a:prstGeom prst="rect">
@@ -18275,7 +18390,7 @@
         </p:nvSpPr>
         <p:spPr>
           <a:xfrm>
-            <a:off x="8853104" y="4570128"/>
+            <a:off x="8682839" y="4549136"/>
             <a:ext cx="922569" cy="523220"/>
           </a:xfrm>
           <a:prstGeom prst="rect">
@@ -18358,7 +18473,7 @@
         </p:nvSpPr>
         <p:spPr>
           <a:xfrm>
-            <a:off x="4117337" y="4002059"/>
+            <a:off x="4157812" y="4075365"/>
             <a:ext cx="2061720" cy="875682"/>
           </a:xfrm>
           <a:prstGeom prst="parallelogram">
@@ -18406,7 +18521,7 @@
         </p:nvSpPr>
         <p:spPr>
           <a:xfrm>
-            <a:off x="4355352" y="4258070"/>
+            <a:off x="4505083" y="4303574"/>
             <a:ext cx="1269643" cy="369332"/>
           </a:xfrm>
           <a:prstGeom prst="rect">
@@ -18445,13 +18560,13 @@
         </p:nvCxnSpPr>
         <p:spPr>
           <a:xfrm rot="16200000" flipV="1">
-            <a:off x="4727134" y="3471536"/>
-            <a:ext cx="1014034" cy="47012"/>
+            <a:off x="4710719" y="3487951"/>
+            <a:ext cx="1087340" cy="87487"/>
           </a:xfrm>
           <a:prstGeom prst="bentConnector4">
             <a:avLst>
-              <a:gd name="adj1" fmla="val 13578"/>
-              <a:gd name="adj2" fmla="val 806071"/>
+              <a:gd name="adj1" fmla="val 16033"/>
+              <a:gd name="adj2" fmla="val 452338"/>
             </a:avLst>
           </a:prstGeom>
           <a:ln>
@@ -21457,23 +21572,55 @@
             </a:r>
             <a:r>
               <a:rPr lang="it-IT" dirty="0"/>
-              <a:t> con il bottone INVIA, appare una pagina ANAGRAFICA con l’elenco degli utenti registrati. L’utente </a:t>
-            </a:r>
-            <a:r>
-              <a:rPr lang="it-IT" dirty="0" err="1"/>
-              <a:t>puo</a:t>
+              <a:t> con il bottone INVIA, appare una pagina ANAGRAFICA con l’elenco degli utenti registrati. L’</a:t>
+            </a:r>
+            <a:r>
+              <a:rPr lang="it-IT" dirty="0">
+                <a:solidFill>
+                  <a:srgbClr val="00B050"/>
+                </a:solidFill>
+              </a:rPr>
+              <a:t>utente</a:t>
             </a:r>
             <a:r>
               <a:rPr lang="it-IT" dirty="0"/>
-              <a:t>̀ scegliere uno o </a:t>
-            </a:r>
-            <a:r>
-              <a:rPr lang="it-IT" dirty="0" err="1"/>
-              <a:t>piu</a:t>
+              <a:t> può̀ scegliere uno o più̀ partecipanti dall’elenco e premere il bottone </a:t>
+            </a:r>
+            <a:r>
+              <a:rPr lang="it-IT" dirty="0">
+                <a:solidFill>
+                  <a:srgbClr val="0E6CFF"/>
+                </a:solidFill>
+              </a:rPr>
+              <a:t>INVITA</a:t>
             </a:r>
             <a:r>
               <a:rPr lang="it-IT" dirty="0"/>
-              <a:t>̀ partecipanti dall’elenco e premere il bottone INVITA per invitarli alla riunione. Se il numero d’invitati è superiore di X unità rispetto al massimo ammissibile, appare di nuovo la pagina ANAGRAFICA con un messaggio “Troppi utenti selezionati, eliminarne almeno X”. La pagina evidenzia nell’elenco gli utenti scelti in precedenza come preselezionati, in modo che l’utente possa deselezionarne alcuni. Se alla pressione del bottone INVITA il numero d’invitati è inferiore al massimo ammissibile, la riunione è memorizzata nella base di dati e associata agli utenti invitati e l’utente è rimandato alla HOME PAGE. Al terzo tentativo scorretto di assegnare troppi invitati a una riunione appare una pagina CANCELLAZIONE con un messaggio “Tre tentativi di definire una riunione con troppi partecipanti, la riunione non </a:t>
+              <a:t> per </a:t>
+            </a:r>
+            <a:r>
+              <a:rPr lang="it-IT" dirty="0">
+                <a:solidFill>
+                  <a:srgbClr val="FF0000"/>
+                </a:solidFill>
+              </a:rPr>
+              <a:t>invitarli</a:t>
+            </a:r>
+            <a:r>
+              <a:rPr lang="it-IT" dirty="0"/>
+              <a:t> alla </a:t>
+            </a:r>
+            <a:r>
+              <a:rPr lang="it-IT" dirty="0">
+                <a:solidFill>
+                  <a:srgbClr val="00B050"/>
+                </a:solidFill>
+              </a:rPr>
+              <a:t>riunione</a:t>
+            </a:r>
+            <a:r>
+              <a:rPr lang="it-IT" dirty="0"/>
+              <a:t>. Se il numero d’invitati è superiore di X unità rispetto al massimo ammissibile, appare di nuovo la pagina ANAGRAFICA con un messaggio “Troppi utenti selezionati, eliminarne almeno X”. La pagina evidenzia nell’elenco gli utenti scelti in precedenza come preselezionati, in modo che l’utente possa deselezionarne alcuni. Se alla pressione del bottone INVITA il numero d’invitati è inferiore al massimo ammissibile, la riunione è memorizzata nella base di dati e associata agli utenti invitati e l’utente è rimandato alla HOME PAGE. Al terzo tentativo scorretto di assegnare troppi invitati a una riunione appare una pagina CANCELLAZIONE con un messaggio “Tre tentativi di definire una riunione con troppi partecipanti, la riunione non </a:t>
             </a:r>
             <a:r>
               <a:rPr lang="it-IT" dirty="0" err="1"/>
@@ -22133,7 +22280,7 @@
         </p:nvSpPr>
         <p:spPr>
           <a:xfrm>
-            <a:off x="2900027" y="2849921"/>
+            <a:off x="2870939" y="2944651"/>
             <a:ext cx="614250" cy="308000"/>
           </a:xfrm>
           <a:prstGeom prst="rect">
@@ -22151,7 +22298,7 @@
           <a:lstStyle/>
           <a:p>
             <a:r>
-              <a:rPr lang="es-419" dirty="0">
+              <a:rPr lang="es-419" sz="1400" dirty="0">
                 <a:solidFill>
                   <a:schemeClr val="dk1"/>
                 </a:solidFill>
@@ -22162,7 +22309,7 @@
               </a:rPr>
               <a:t>0:n</a:t>
             </a:r>
-            <a:endParaRPr dirty="0">
+            <a:endParaRPr sz="1400" dirty="0">
               <a:solidFill>
                 <a:schemeClr val="dk1"/>
               </a:solidFill>
@@ -22316,7 +22463,7 @@
         </p:nvSpPr>
         <p:spPr>
           <a:xfrm>
-            <a:off x="8720260" y="4026949"/>
+            <a:off x="8598024" y="3946854"/>
             <a:ext cx="450125" cy="369200"/>
           </a:xfrm>
           <a:prstGeom prst="rect">
@@ -22371,7 +22518,7 @@
         </p:nvSpPr>
         <p:spPr>
           <a:xfrm>
-            <a:off x="2929114" y="4057873"/>
+            <a:off x="2896627" y="3957296"/>
             <a:ext cx="556075" cy="369200"/>
           </a:xfrm>
           <a:prstGeom prst="rect">
@@ -22389,7 +22536,7 @@
           <a:lstStyle/>
           <a:p>
             <a:r>
-              <a:rPr lang="es-419" dirty="0">
+              <a:rPr lang="es-419" sz="1400" dirty="0">
                 <a:solidFill>
                   <a:schemeClr val="dk1"/>
                 </a:solidFill>
@@ -22400,7 +22547,7 @@
               </a:rPr>
               <a:t>0:n</a:t>
             </a:r>
-            <a:endParaRPr dirty="0">
+            <a:endParaRPr sz="1400" dirty="0">
               <a:solidFill>
                 <a:schemeClr val="dk1"/>
               </a:solidFill>
@@ -22426,7 +22573,7 @@
         </p:nvSpPr>
         <p:spPr>
           <a:xfrm>
-            <a:off x="8720266" y="2833981"/>
+            <a:off x="8590383" y="2967383"/>
             <a:ext cx="450125" cy="307600"/>
           </a:xfrm>
           <a:prstGeom prst="rect">
@@ -22971,7 +23118,62 @@
         </p:nvSpPr>
         <p:spPr>
           <a:xfrm>
-            <a:off x="6722333" y="5203071"/>
+            <a:off x="6685812" y="5235403"/>
+            <a:ext cx="450125" cy="307600"/>
+          </a:xfrm>
+          <a:prstGeom prst="rect">
+            <a:avLst/>
+          </a:prstGeom>
+          <a:noFill/>
+          <a:ln>
+            <a:noFill/>
+          </a:ln>
+        </p:spPr>
+        <p:txBody>
+          <a:bodyPr spcFirstLastPara="1" wrap="square" lIns="107269" tIns="53620" rIns="107269" bIns="53620" anchor="t" anchorCtr="0">
+            <a:noAutofit/>
+          </a:bodyPr>
+          <a:lstStyle/>
+          <a:p>
+            <a:r>
+              <a:rPr lang="es-419" sz="1400" dirty="0">
+                <a:solidFill>
+                  <a:schemeClr val="dk1"/>
+                </a:solidFill>
+                <a:latin typeface="Calibri"/>
+                <a:ea typeface="Calibri"/>
+                <a:cs typeface="Calibri"/>
+                <a:sym typeface="Calibri"/>
+              </a:rPr>
+              <a:t>1:1</a:t>
+            </a:r>
+            <a:endParaRPr sz="1400" dirty="0">
+              <a:solidFill>
+                <a:schemeClr val="dk1"/>
+              </a:solidFill>
+              <a:latin typeface="Calibri"/>
+              <a:ea typeface="Calibri"/>
+              <a:cs typeface="Calibri"/>
+              <a:sym typeface="Calibri"/>
+            </a:endParaRPr>
+          </a:p>
+        </p:txBody>
+      </p:sp>
+      <p:sp>
+        <p:nvSpPr>
+          <p:cNvPr id="27" name="Google Shape;165;p28">
+            <a:extLst>
+              <a:ext uri="{FF2B5EF4-FFF2-40B4-BE49-F238E27FC236}">
+                <a16:creationId xmlns:a16="http://schemas.microsoft.com/office/drawing/2014/main" id="{06473F3D-7A24-A505-217C-A8374FA5CA19}"/>
+              </a:ext>
+            </a:extLst>
+          </p:cNvPr>
+          <p:cNvSpPr txBox="1"/>
+          <p:nvPr/>
+        </p:nvSpPr>
+        <p:spPr>
+          <a:xfrm>
+            <a:off x="4671493" y="5232466"/>
             <a:ext cx="450125" cy="307600"/>
           </a:xfrm>
           <a:prstGeom prst="rect">
@@ -23987,15 +24189,7 @@
             </a:r>
             <a:r>
               <a:rPr lang="it-IT" dirty="0"/>
-              <a:t>. La registrazione controlla la </a:t>
-            </a:r>
-            <a:r>
-              <a:rPr lang="it-IT" dirty="0" err="1"/>
-              <a:t>validita</a:t>
-            </a:r>
-            <a:r>
-              <a:rPr lang="it-IT" dirty="0"/>
-              <a:t>̀ sintattica dell’indirizzo di email e l’uguaglianza tra i campi “password” e “ripeti password”. La registrazione controlla l’</a:t>
+              <a:t>. La registrazione controlla la validità̀ sintattica dell’indirizzo di email e l’uguaglianza tra i campi “password” e “ripeti password”. La registrazione controlla l’</a:t>
             </a:r>
             <a:r>
               <a:rPr lang="it-IT" dirty="0" err="1"/>
@@ -24179,7 +24373,19 @@
             </a:r>
             <a:r>
               <a:rPr lang="it-IT" dirty="0"/>
-              <a:t>con un messaggio “Troppi utenti selezionati, eliminarne almeno X”. La pagina evidenzia nell’elenco gli utenti scelti in precedenza come preselezionati, in modo che </a:t>
+              <a:t>con un </a:t>
+            </a:r>
+            <a:r>
+              <a:rPr lang="it-IT" dirty="0">
+                <a:solidFill>
+                  <a:srgbClr val="00B050"/>
+                </a:solidFill>
+              </a:rPr>
+              <a:t>messaggio</a:t>
+            </a:r>
+            <a:r>
+              <a:rPr lang="it-IT" dirty="0"/>
+              <a:t> “Troppi utenti selezionati, eliminarne almeno X”. La pagina evidenzia nell’elenco gli utenti scelti in precedenza come preselezionati, in modo che </a:t>
             </a:r>
             <a:r>
               <a:rPr lang="it-IT" dirty="0">

</xml_diff>